<commit_message>
Include the latest changes after adding some analysis
</commit_message>
<xml_diff>
--- a/Subhabrata_Ghosh_Lending_Club_Case_Study.pptx
+++ b/Subhabrata_Ghosh_Lending_Club_Case_Study.pptx
@@ -4509,7 +4509,7 @@
           <a:p>
             <a:fld id="{56EBBED9-6560-4149-B575-D9C9746E3F7F}" type="datetimeFigureOut">
               <a:rPr lang="en-US" smtClean="0"/>
-              <a:t>8/14/2020</a:t>
+              <a:t>8/16/2020</a:t>
             </a:fld>
             <a:endParaRPr lang="en-US"/>
           </a:p>
@@ -4784,7 +4784,7 @@
           <a:p>
             <a:fld id="{56EBBED9-6560-4149-B575-D9C9746E3F7F}" type="datetimeFigureOut">
               <a:rPr lang="en-US" smtClean="0"/>
-              <a:t>8/14/2020</a:t>
+              <a:t>8/16/2020</a:t>
             </a:fld>
             <a:endParaRPr lang="en-US"/>
           </a:p>
@@ -4978,7 +4978,7 @@
           <a:p>
             <a:fld id="{56EBBED9-6560-4149-B575-D9C9746E3F7F}" type="datetimeFigureOut">
               <a:rPr lang="en-US" smtClean="0"/>
-              <a:t>8/14/2020</a:t>
+              <a:t>8/16/2020</a:t>
             </a:fld>
             <a:endParaRPr lang="en-US"/>
           </a:p>
@@ -5251,7 +5251,7 @@
           <a:p>
             <a:fld id="{56EBBED9-6560-4149-B575-D9C9746E3F7F}" type="datetimeFigureOut">
               <a:rPr lang="en-US" smtClean="0"/>
-              <a:t>8/14/2020</a:t>
+              <a:t>8/16/2020</a:t>
             </a:fld>
             <a:endParaRPr lang="en-US"/>
           </a:p>
@@ -5592,7 +5592,7 @@
           <a:p>
             <a:fld id="{56EBBED9-6560-4149-B575-D9C9746E3F7F}" type="datetimeFigureOut">
               <a:rPr lang="en-US" smtClean="0"/>
-              <a:t>8/14/2020</a:t>
+              <a:t>8/16/2020</a:t>
             </a:fld>
             <a:endParaRPr lang="en-US"/>
           </a:p>
@@ -6215,7 +6215,7 @@
           <a:p>
             <a:fld id="{56EBBED9-6560-4149-B575-D9C9746E3F7F}" type="datetimeFigureOut">
               <a:rPr lang="en-US" smtClean="0"/>
-              <a:t>8/14/2020</a:t>
+              <a:t>8/16/2020</a:t>
             </a:fld>
             <a:endParaRPr lang="en-US"/>
           </a:p>
@@ -7075,7 +7075,7 @@
           <a:p>
             <a:fld id="{56EBBED9-6560-4149-B575-D9C9746E3F7F}" type="datetimeFigureOut">
               <a:rPr lang="en-US" smtClean="0"/>
-              <a:t>8/14/2020</a:t>
+              <a:t>8/16/2020</a:t>
             </a:fld>
             <a:endParaRPr lang="en-US"/>
           </a:p>
@@ -7245,7 +7245,7 @@
           <a:p>
             <a:fld id="{56EBBED9-6560-4149-B575-D9C9746E3F7F}" type="datetimeFigureOut">
               <a:rPr lang="en-US" smtClean="0"/>
-              <a:t>8/14/2020</a:t>
+              <a:t>8/16/2020</a:t>
             </a:fld>
             <a:endParaRPr lang="en-US"/>
           </a:p>
@@ -7425,7 +7425,7 @@
           <a:p>
             <a:fld id="{56EBBED9-6560-4149-B575-D9C9746E3F7F}" type="datetimeFigureOut">
               <a:rPr lang="en-US" smtClean="0"/>
-              <a:t>8/14/2020</a:t>
+              <a:t>8/16/2020</a:t>
             </a:fld>
             <a:endParaRPr lang="en-US"/>
           </a:p>
@@ -7595,7 +7595,7 @@
           <a:p>
             <a:fld id="{56EBBED9-6560-4149-B575-D9C9746E3F7F}" type="datetimeFigureOut">
               <a:rPr lang="en-US" smtClean="0"/>
-              <a:t>8/14/2020</a:t>
+              <a:t>8/16/2020</a:t>
             </a:fld>
             <a:endParaRPr lang="en-US"/>
           </a:p>
@@ -7842,7 +7842,7 @@
           <a:p>
             <a:fld id="{56EBBED9-6560-4149-B575-D9C9746E3F7F}" type="datetimeFigureOut">
               <a:rPr lang="en-US" smtClean="0"/>
-              <a:t>8/14/2020</a:t>
+              <a:t>8/16/2020</a:t>
             </a:fld>
             <a:endParaRPr lang="en-US"/>
           </a:p>
@@ -8134,7 +8134,7 @@
           <a:p>
             <a:fld id="{56EBBED9-6560-4149-B575-D9C9746E3F7F}" type="datetimeFigureOut">
               <a:rPr lang="en-US" smtClean="0"/>
-              <a:t>8/14/2020</a:t>
+              <a:t>8/16/2020</a:t>
             </a:fld>
             <a:endParaRPr lang="en-US"/>
           </a:p>
@@ -8578,7 +8578,7 @@
           <a:p>
             <a:fld id="{56EBBED9-6560-4149-B575-D9C9746E3F7F}" type="datetimeFigureOut">
               <a:rPr lang="en-US" smtClean="0"/>
-              <a:t>8/14/2020</a:t>
+              <a:t>8/16/2020</a:t>
             </a:fld>
             <a:endParaRPr lang="en-US"/>
           </a:p>
@@ -8696,7 +8696,7 @@
           <a:p>
             <a:fld id="{56EBBED9-6560-4149-B575-D9C9746E3F7F}" type="datetimeFigureOut">
               <a:rPr lang="en-US" smtClean="0"/>
-              <a:t>8/14/2020</a:t>
+              <a:t>8/16/2020</a:t>
             </a:fld>
             <a:endParaRPr lang="en-US"/>
           </a:p>
@@ -8791,7 +8791,7 @@
           <a:p>
             <a:fld id="{56EBBED9-6560-4149-B575-D9C9746E3F7F}" type="datetimeFigureOut">
               <a:rPr lang="en-US" smtClean="0"/>
-              <a:t>8/14/2020</a:t>
+              <a:t>8/16/2020</a:t>
             </a:fld>
             <a:endParaRPr lang="en-US"/>
           </a:p>
@@ -9070,7 +9070,7 @@
           <a:p>
             <a:fld id="{56EBBED9-6560-4149-B575-D9C9746E3F7F}" type="datetimeFigureOut">
               <a:rPr lang="en-US" smtClean="0"/>
-              <a:t>8/14/2020</a:t>
+              <a:t>8/16/2020</a:t>
             </a:fld>
             <a:endParaRPr lang="en-US"/>
           </a:p>
@@ -9345,7 +9345,7 @@
           <a:p>
             <a:fld id="{56EBBED9-6560-4149-B575-D9C9746E3F7F}" type="datetimeFigureOut">
               <a:rPr lang="en-US" smtClean="0"/>
-              <a:t>8/14/2020</a:t>
+              <a:t>8/16/2020</a:t>
             </a:fld>
             <a:endParaRPr lang="en-US"/>
           </a:p>
@@ -9774,7 +9774,7 @@
           <a:p>
             <a:fld id="{56EBBED9-6560-4149-B575-D9C9746E3F7F}" type="datetimeFigureOut">
               <a:rPr lang="en-US" smtClean="0"/>
-              <a:t>8/14/2020</a:t>
+              <a:t>8/16/2020</a:t>
             </a:fld>
             <a:endParaRPr lang="en-US"/>
           </a:p>
@@ -11396,7 +11396,6 @@
               <a:rPr lang="en-US" dirty="0"/>
               <a:t> Rate</a:t>
             </a:r>
-            <a:endParaRPr lang="en-US" dirty="0"/>
           </a:p>
         </p:txBody>
       </p:sp>
@@ -11481,8 +11480,32 @@
         </p:blipFill>
         <p:spPr>
           <a:xfrm>
-            <a:off x="2189416" y="2768727"/>
-            <a:ext cx="7648575" cy="3752850"/>
+            <a:off x="497008" y="2854426"/>
+            <a:ext cx="3718376" cy="2522246"/>
+          </a:xfrm>
+          <a:prstGeom prst="rect">
+            <a:avLst/>
+          </a:prstGeom>
+        </p:spPr>
+      </p:pic>
+      <p:pic>
+        <p:nvPicPr>
+          <p:cNvPr id="5" name="Picture 4"/>
+          <p:cNvPicPr>
+            <a:picLocks noChangeAspect="1"/>
+          </p:cNvPicPr>
+          <p:nvPr/>
+        </p:nvPicPr>
+        <p:blipFill>
+          <a:blip r:embed="rId3"/>
+          <a:stretch>
+            <a:fillRect/>
+          </a:stretch>
+        </p:blipFill>
+        <p:spPr>
+          <a:xfrm>
+            <a:off x="4526281" y="2569464"/>
+            <a:ext cx="7196328" cy="4037812"/>
           </a:xfrm>
           <a:prstGeom prst="rect">
             <a:avLst/>
@@ -11542,7 +11565,6 @@
               <a:rPr lang="en-US" dirty="0"/>
               <a:t>by prior bad record</a:t>
             </a:r>
-            <a:endParaRPr lang="en-US" dirty="0"/>
           </a:p>
         </p:txBody>
       </p:sp>
@@ -11942,7 +11964,6 @@
               <a:rPr lang="en-US" dirty="0"/>
               <a:t> greater than 20</a:t>
             </a:r>
-            <a:endParaRPr lang="en-US" dirty="0"/>
           </a:p>
         </p:txBody>
       </p:sp>

</xml_diff>